<commit_message>
work on Slides & code
</commit_message>
<xml_diff>
--- a/VS2017 Features.pptx
+++ b/VS2017 Features.pptx
@@ -7,10 +7,10 @@
     <p:sldMasterId id="2147483675" r:id="rId7"/>
   </p:sldMasterIdLst>
   <p:notesMasterIdLst>
-    <p:notesMasterId r:id="rId20"/>
+    <p:notesMasterId r:id="rId24"/>
   </p:notesMasterIdLst>
   <p:handoutMasterIdLst>
-    <p:handoutMasterId r:id="rId21"/>
+    <p:handoutMasterId r:id="rId25"/>
   </p:handoutMasterIdLst>
   <p:sldIdLst>
     <p:sldId id="256" r:id="rId8"/>
@@ -18,13 +18,17 @@
     <p:sldId id="258" r:id="rId10"/>
     <p:sldId id="259" r:id="rId11"/>
     <p:sldId id="260" r:id="rId12"/>
-    <p:sldId id="261" r:id="rId13"/>
-    <p:sldId id="264" r:id="rId14"/>
-    <p:sldId id="262" r:id="rId15"/>
-    <p:sldId id="265" r:id="rId16"/>
-    <p:sldId id="266" r:id="rId17"/>
-    <p:sldId id="263" r:id="rId18"/>
-    <p:sldId id="267" r:id="rId19"/>
+    <p:sldId id="262" r:id="rId13"/>
+    <p:sldId id="269" r:id="rId14"/>
+    <p:sldId id="265" r:id="rId15"/>
+    <p:sldId id="266" r:id="rId16"/>
+    <p:sldId id="268" r:id="rId17"/>
+    <p:sldId id="271" r:id="rId18"/>
+    <p:sldId id="261" r:id="rId19"/>
+    <p:sldId id="264" r:id="rId20"/>
+    <p:sldId id="263" r:id="rId21"/>
+    <p:sldId id="270" r:id="rId22"/>
+    <p:sldId id="267" r:id="rId23"/>
   </p:sldIdLst>
   <p:sldSz cx="9144000" cy="5143500" type="screen16x9"/>
   <p:notesSz cx="9926638" cy="6797675"/>
@@ -231,7 +235,7 @@
               <a:rPr lang="de-AT" smtClean="0">
                 <a:latin typeface="Segoe UI" panose="020B0502040204020203" pitchFamily="34" charset="0"/>
               </a:rPr>
-              <a:t>03.04.17</a:t>
+              <a:t>05.04.17</a:t>
             </a:fld>
             <a:endParaRPr lang="de-AT" dirty="0">
               <a:latin typeface="Segoe UI" panose="020B0502040204020203" pitchFamily="34" charset="0"/>
@@ -409,7 +413,7 @@
             <a:fld id="{1798F7A8-73FE-44D0-A259-89D4173863AE}" type="datetimeFigureOut">
               <a:rPr lang="de-AT" smtClean="0"/>
               <a:pPr/>
-              <a:t>03.04.17</a:t>
+              <a:t>05.04.17</a:t>
             </a:fld>
             <a:endParaRPr lang="de-AT" dirty="0"/>
           </a:p>
@@ -4700,11 +4704,7 @@
           <a:p>
             <a:r>
               <a:rPr lang="de-AT" dirty="0" smtClean="0"/>
-              <a:t>Raoul Holzer (</a:t>
-            </a:r>
-            <a:r>
-              <a:rPr lang="de-AT" dirty="0" smtClean="0"/>
-              <a:t>@</a:t>
+              <a:t>Raoul Holzer (@</a:t>
             </a:r>
             <a:r>
               <a:rPr lang="de-AT" dirty="0" err="1" smtClean="0"/>
@@ -4714,7 +4714,6 @@
               <a:rPr lang="de-AT" dirty="0" smtClean="0"/>
               <a:t>)</a:t>
             </a:r>
-            <a:endParaRPr lang="de-AT" dirty="0" smtClean="0"/>
           </a:p>
           <a:p>
             <a:r>
@@ -4807,52 +4806,7 @@
       </p:grpSpPr>
       <p:sp>
         <p:nvSpPr>
-          <p:cNvPr id="4" name="Text Placeholder 3"/>
-          <p:cNvSpPr>
-            <a:spLocks noGrp="1"/>
-          </p:cNvSpPr>
-          <p:nvPr>
-            <p:ph type="body" sz="quarter" idx="13"/>
-          </p:nvPr>
-        </p:nvSpPr>
-        <p:spPr/>
-        <p:txBody>
-          <a:bodyPr/>
-          <a:lstStyle/>
-          <a:p>
-            <a:r>
-              <a:rPr lang="en-US" dirty="0" smtClean="0"/>
-              <a:t>Ctrl+. (Dot)  =&gt; R# </a:t>
-            </a:r>
-            <a:r>
-              <a:rPr lang="en-US" dirty="0" err="1" smtClean="0"/>
-              <a:t>Alt+Enter</a:t>
-            </a:r>
-            <a:r>
-              <a:rPr lang="en-US" dirty="0" smtClean="0"/>
-              <a:t> </a:t>
-            </a:r>
-          </a:p>
-          <a:p>
-            <a:r>
-              <a:rPr lang="en-US" dirty="0" smtClean="0"/>
-              <a:t>Ctrl+, (Comma) =&gt; </a:t>
-            </a:r>
-            <a:r>
-              <a:rPr lang="en-US" dirty="0" err="1" smtClean="0"/>
-              <a:t>Goto</a:t>
-            </a:r>
-            <a:r>
-              <a:rPr lang="en-US" dirty="0" smtClean="0"/>
-              <a:t> All</a:t>
-            </a:r>
-            <a:endParaRPr lang="en-US" dirty="0"/>
-          </a:p>
-        </p:txBody>
-      </p:sp>
-      <p:sp>
-        <p:nvSpPr>
-          <p:cNvPr id="3" name="Title 2"/>
+          <p:cNvPr id="2" name="Title 1"/>
           <p:cNvSpPr>
             <a:spLocks noGrp="1"/>
           </p:cNvSpPr>
@@ -4867,7 +4821,11 @@
           <a:p>
             <a:r>
               <a:rPr lang="en-US" dirty="0" smtClean="0"/>
-              <a:t>Important shortcuts</a:t>
+              <a:t>.</a:t>
+            </a:r>
+            <a:r>
+              <a:rPr lang="en-US" dirty="0" err="1" smtClean="0"/>
+              <a:t>editorconfig</a:t>
             </a:r>
             <a:endParaRPr lang="en-US" dirty="0"/>
           </a:p>
@@ -4876,7 +4834,7 @@
     </p:spTree>
     <p:extLst>
       <p:ext uri="{BB962C8B-B14F-4D97-AF65-F5344CB8AC3E}">
-        <p14:creationId xmlns:p14="http://schemas.microsoft.com/office/powerpoint/2010/main" val="319059629"/>
+        <p14:creationId xmlns:p14="http://schemas.microsoft.com/office/powerpoint/2010/main" val="700412232"/>
       </p:ext>
     </p:extLst>
   </p:cSld>
@@ -4920,6 +4878,169 @@
           <a:p>
             <a:r>
               <a:rPr lang="en-US" dirty="0" smtClean="0"/>
+              <a:t>Test Explorer </a:t>
+            </a:r>
+            <a:r>
+              <a:rPr lang="en-US" dirty="0" err="1" smtClean="0"/>
+              <a:t>Improvments</a:t>
+            </a:r>
+            <a:endParaRPr lang="en-US" dirty="0"/>
+          </a:p>
+        </p:txBody>
+      </p:sp>
+    </p:spTree>
+    <p:extLst>
+      <p:ext uri="{BB962C8B-B14F-4D97-AF65-F5344CB8AC3E}">
+        <p14:creationId xmlns:p14="http://schemas.microsoft.com/office/powerpoint/2010/main" val="907995758"/>
+      </p:ext>
+    </p:extLst>
+  </p:cSld>
+  <p:clrMapOvr>
+    <a:masterClrMapping/>
+  </p:clrMapOvr>
+</p:sld>
+</file>
+
+<file path=ppt/slides/slide12.xml><?xml version="1.0" encoding="utf-8"?>
+<p:sld xmlns:a="http://schemas.openxmlformats.org/drawingml/2006/main" xmlns:r="http://schemas.openxmlformats.org/officeDocument/2006/relationships" xmlns:p="http://schemas.openxmlformats.org/presentationml/2006/main">
+  <p:cSld>
+    <p:spTree>
+      <p:nvGrpSpPr>
+        <p:cNvPr id="1" name=""/>
+        <p:cNvGrpSpPr/>
+        <p:nvPr/>
+      </p:nvGrpSpPr>
+      <p:grpSpPr>
+        <a:xfrm>
+          <a:off x="0" y="0"/>
+          <a:ext cx="0" cy="0"/>
+          <a:chOff x="0" y="0"/>
+          <a:chExt cx="0" cy="0"/>
+        </a:xfrm>
+      </p:grpSpPr>
+      <p:sp>
+        <p:nvSpPr>
+          <p:cNvPr id="4" name="Title 3"/>
+          <p:cNvSpPr>
+            <a:spLocks noGrp="1"/>
+          </p:cNvSpPr>
+          <p:nvPr>
+            <p:ph type="title"/>
+          </p:nvPr>
+        </p:nvSpPr>
+        <p:spPr/>
+        <p:txBody>
+          <a:bodyPr/>
+          <a:lstStyle/>
+          <a:p>
+            <a:r>
+              <a:rPr lang="en-US" dirty="0" smtClean="0"/>
+              <a:t>Live unit testing</a:t>
+            </a:r>
+            <a:endParaRPr lang="en-US" dirty="0"/>
+          </a:p>
+        </p:txBody>
+      </p:sp>
+    </p:spTree>
+    <p:extLst>
+      <p:ext uri="{BB962C8B-B14F-4D97-AF65-F5344CB8AC3E}">
+        <p14:creationId xmlns:p14="http://schemas.microsoft.com/office/powerpoint/2010/main" val="9582585"/>
+      </p:ext>
+    </p:extLst>
+  </p:cSld>
+  <p:clrMapOvr>
+    <a:masterClrMapping/>
+  </p:clrMapOvr>
+</p:sld>
+</file>
+
+<file path=ppt/slides/slide13.xml><?xml version="1.0" encoding="utf-8"?>
+<p:sld xmlns:a="http://schemas.openxmlformats.org/drawingml/2006/main" xmlns:r="http://schemas.openxmlformats.org/officeDocument/2006/relationships" xmlns:p="http://schemas.openxmlformats.org/presentationml/2006/main">
+  <p:cSld>
+    <p:spTree>
+      <p:nvGrpSpPr>
+        <p:cNvPr id="1" name=""/>
+        <p:cNvGrpSpPr/>
+        <p:nvPr/>
+      </p:nvGrpSpPr>
+      <p:grpSpPr>
+        <a:xfrm>
+          <a:off x="0" y="0"/>
+          <a:ext cx="0" cy="0"/>
+          <a:chOff x="0" y="0"/>
+          <a:chExt cx="0" cy="0"/>
+        </a:xfrm>
+      </p:grpSpPr>
+      <p:sp>
+        <p:nvSpPr>
+          <p:cNvPr id="2" name="Title 1"/>
+          <p:cNvSpPr>
+            <a:spLocks noGrp="1"/>
+          </p:cNvSpPr>
+          <p:nvPr>
+            <p:ph type="title"/>
+          </p:nvPr>
+        </p:nvSpPr>
+        <p:spPr/>
+        <p:txBody>
+          <a:bodyPr/>
+          <a:lstStyle/>
+          <a:p>
+            <a:r>
+              <a:rPr lang="en-US" dirty="0" smtClean="0"/>
+              <a:t>Debugging enhancements</a:t>
+            </a:r>
+            <a:endParaRPr lang="en-US" dirty="0"/>
+          </a:p>
+        </p:txBody>
+      </p:sp>
+    </p:spTree>
+    <p:extLst>
+      <p:ext uri="{BB962C8B-B14F-4D97-AF65-F5344CB8AC3E}">
+        <p14:creationId xmlns:p14="http://schemas.microsoft.com/office/powerpoint/2010/main" val="1858540963"/>
+      </p:ext>
+    </p:extLst>
+  </p:cSld>
+  <p:clrMapOvr>
+    <a:masterClrMapping/>
+  </p:clrMapOvr>
+</p:sld>
+</file>
+
+<file path=ppt/slides/slide14.xml><?xml version="1.0" encoding="utf-8"?>
+<p:sld xmlns:a="http://schemas.openxmlformats.org/drawingml/2006/main" xmlns:r="http://schemas.openxmlformats.org/officeDocument/2006/relationships" xmlns:p="http://schemas.openxmlformats.org/presentationml/2006/main">
+  <p:cSld>
+    <p:spTree>
+      <p:nvGrpSpPr>
+        <p:cNvPr id="1" name=""/>
+        <p:cNvGrpSpPr/>
+        <p:nvPr/>
+      </p:nvGrpSpPr>
+      <p:grpSpPr>
+        <a:xfrm>
+          <a:off x="0" y="0"/>
+          <a:ext cx="0" cy="0"/>
+          <a:chOff x="0" y="0"/>
+          <a:chExt cx="0" cy="0"/>
+        </a:xfrm>
+      </p:grpSpPr>
+      <p:sp>
+        <p:nvSpPr>
+          <p:cNvPr id="2" name="Title 1"/>
+          <p:cNvSpPr>
+            <a:spLocks noGrp="1"/>
+          </p:cNvSpPr>
+          <p:nvPr>
+            <p:ph type="title"/>
+          </p:nvPr>
+        </p:nvSpPr>
+        <p:spPr/>
+        <p:txBody>
+          <a:bodyPr/>
+          <a:lstStyle/>
+          <a:p>
+            <a:r>
+              <a:rPr lang="en-US" dirty="0" smtClean="0"/>
               <a:t>Extension Roaming Manager</a:t>
             </a:r>
             <a:endParaRPr lang="en-US" dirty="0"/>
@@ -4939,7 +5060,115 @@
 </p:sld>
 </file>
 
-<file path=ppt/slides/slide12.xml><?xml version="1.0" encoding="utf-8"?>
+<file path=ppt/slides/slide15.xml><?xml version="1.0" encoding="utf-8"?>
+<p:sld xmlns:a="http://schemas.openxmlformats.org/drawingml/2006/main" xmlns:r="http://schemas.openxmlformats.org/officeDocument/2006/relationships" xmlns:p="http://schemas.openxmlformats.org/presentationml/2006/main">
+  <p:cSld>
+    <p:spTree>
+      <p:nvGrpSpPr>
+        <p:cNvPr id="1" name=""/>
+        <p:cNvGrpSpPr/>
+        <p:nvPr/>
+      </p:nvGrpSpPr>
+      <p:grpSpPr>
+        <a:xfrm>
+          <a:off x="0" y="0"/>
+          <a:ext cx="0" cy="0"/>
+          <a:chOff x="0" y="0"/>
+          <a:chExt cx="0" cy="0"/>
+        </a:xfrm>
+      </p:grpSpPr>
+      <p:sp>
+        <p:nvSpPr>
+          <p:cNvPr id="6" name="Text Placeholder 5"/>
+          <p:cNvSpPr>
+            <a:spLocks noGrp="1"/>
+          </p:cNvSpPr>
+          <p:nvPr>
+            <p:ph type="body" sz="quarter" idx="12"/>
+          </p:nvPr>
+        </p:nvSpPr>
+        <p:spPr/>
+        <p:txBody>
+          <a:bodyPr/>
+          <a:lstStyle/>
+          <a:p>
+            <a:r>
+              <a:rPr lang="en-US" dirty="0" smtClean="0"/>
+              <a:t>25. April 17:30</a:t>
+            </a:r>
+          </a:p>
+          <a:p>
+            <a:r>
+              <a:rPr lang="en-US" dirty="0" smtClean="0"/>
+              <a:t>https</a:t>
+            </a:r>
+            <a:r>
+              <a:rPr lang="en-US" dirty="0"/>
+              <a:t>://</a:t>
+            </a:r>
+            <a:r>
+              <a:rPr lang="en-US" dirty="0" err="1"/>
+              <a:t>www.meetup.com</a:t>
+            </a:r>
+            <a:r>
+              <a:rPr lang="en-US" dirty="0"/>
+              <a:t>/NET-User-Group-Austria-Meetup/events/238222081/</a:t>
+            </a:r>
+          </a:p>
+        </p:txBody>
+      </p:sp>
+      <p:sp>
+        <p:nvSpPr>
+          <p:cNvPr id="5" name="Title 4"/>
+          <p:cNvSpPr>
+            <a:spLocks noGrp="1"/>
+          </p:cNvSpPr>
+          <p:nvPr>
+            <p:ph type="title"/>
+          </p:nvPr>
+        </p:nvSpPr>
+        <p:spPr/>
+        <p:txBody>
+          <a:bodyPr/>
+          <a:lstStyle/>
+          <a:p>
+            <a:r>
+              <a:rPr lang="en-US" dirty="0" smtClean="0"/>
+              <a:t>C#7  und </a:t>
+            </a:r>
+            <a:r>
+              <a:rPr lang="en-US" dirty="0" err="1" smtClean="0"/>
+              <a:t>ASP.Net</a:t>
+            </a:r>
+            <a:r>
+              <a:rPr lang="en-US" dirty="0" smtClean="0"/>
+              <a:t> Core</a:t>
+            </a:r>
+            <a:br>
+              <a:rPr lang="en-US" dirty="0" smtClean="0"/>
+            </a:br>
+            <a:r>
+              <a:rPr lang="en-US" sz="1800" dirty="0" smtClean="0"/>
+              <a:t>by Christian Nagel</a:t>
+            </a:r>
+            <a:endParaRPr lang="en-US" dirty="0"/>
+          </a:p>
+        </p:txBody>
+      </p:sp>
+    </p:spTree>
+    <p:extLst>
+      <p:ext uri="{BB962C8B-B14F-4D97-AF65-F5344CB8AC3E}">
+        <p14:creationId xmlns:p14="http://schemas.microsoft.com/office/powerpoint/2010/main" val="533081011"/>
+      </p:ext>
+    </p:extLst>
+  </p:cSld>
+  <p:clrMapOvr>
+    <a:masterClrMapping/>
+  </p:clrMapOvr>
+</p:sld>
+</file>
+
+<file path=ppt/slides/slide16.xml><?xml version="1.0" encoding="utf-8"?>
 <p:sld xmlns:a="http://schemas.openxmlformats.org/drawingml/2006/main" xmlns:r="http://schemas.openxmlformats.org/officeDocument/2006/relationships" xmlns:p="http://schemas.openxmlformats.org/presentationml/2006/main">
   <p:cSld>
     <p:spTree>
@@ -5475,7 +5704,7 @@
       </p:grpSpPr>
       <p:sp>
         <p:nvSpPr>
-          <p:cNvPr id="4" name="Title 3"/>
+          <p:cNvPr id="2" name="Title 1"/>
           <p:cNvSpPr>
             <a:spLocks noGrp="1"/>
           </p:cNvSpPr>
@@ -5490,7 +5719,7 @@
           <a:p>
             <a:r>
               <a:rPr lang="en-US" dirty="0" smtClean="0"/>
-              <a:t>Live unit testing</a:t>
+              <a:t>Lightweight solution load</a:t>
             </a:r>
             <a:endParaRPr lang="en-US" dirty="0"/>
           </a:p>
@@ -5499,7 +5728,7 @@
     </p:spTree>
     <p:extLst>
       <p:ext uri="{BB962C8B-B14F-4D97-AF65-F5344CB8AC3E}">
-        <p14:creationId xmlns:p14="http://schemas.microsoft.com/office/powerpoint/2010/main" val="9582585"/>
+        <p14:creationId xmlns:p14="http://schemas.microsoft.com/office/powerpoint/2010/main" val="1124667569"/>
       </p:ext>
     </p:extLst>
   </p:cSld>
@@ -5543,7 +5772,7 @@
           <a:p>
             <a:r>
               <a:rPr lang="en-US" dirty="0" smtClean="0"/>
-              <a:t>Debugging enhancements</a:t>
+              <a:t>Advanced IntelliSense &amp; Code navigation changes</a:t>
             </a:r>
             <a:endParaRPr lang="en-US" dirty="0"/>
           </a:p>
@@ -5552,7 +5781,7 @@
     </p:spTree>
     <p:extLst>
       <p:ext uri="{BB962C8B-B14F-4D97-AF65-F5344CB8AC3E}">
-        <p14:creationId xmlns:p14="http://schemas.microsoft.com/office/powerpoint/2010/main" val="1858540963"/>
+        <p14:creationId xmlns:p14="http://schemas.microsoft.com/office/powerpoint/2010/main" val="1902326297"/>
       </p:ext>
     </p:extLst>
   </p:cSld>
@@ -5563,59 +5792,6 @@
 </file>
 
 <file path=ppt/slides/slide8.xml><?xml version="1.0" encoding="utf-8"?>
-<p:sld xmlns:a="http://schemas.openxmlformats.org/drawingml/2006/main" xmlns:r="http://schemas.openxmlformats.org/officeDocument/2006/relationships" xmlns:p="http://schemas.openxmlformats.org/presentationml/2006/main">
-  <p:cSld>
-    <p:spTree>
-      <p:nvGrpSpPr>
-        <p:cNvPr id="1" name=""/>
-        <p:cNvGrpSpPr/>
-        <p:nvPr/>
-      </p:nvGrpSpPr>
-      <p:grpSpPr>
-        <a:xfrm>
-          <a:off x="0" y="0"/>
-          <a:ext cx="0" cy="0"/>
-          <a:chOff x="0" y="0"/>
-          <a:chExt cx="0" cy="0"/>
-        </a:xfrm>
-      </p:grpSpPr>
-      <p:sp>
-        <p:nvSpPr>
-          <p:cNvPr id="2" name="Title 1"/>
-          <p:cNvSpPr>
-            <a:spLocks noGrp="1"/>
-          </p:cNvSpPr>
-          <p:nvPr>
-            <p:ph type="title"/>
-          </p:nvPr>
-        </p:nvSpPr>
-        <p:spPr/>
-        <p:txBody>
-          <a:bodyPr/>
-          <a:lstStyle/>
-          <a:p>
-            <a:r>
-              <a:rPr lang="en-US" dirty="0" smtClean="0"/>
-              <a:t>Advanced IntelliSense &amp; Code navigation changes</a:t>
-            </a:r>
-            <a:endParaRPr lang="en-US" dirty="0"/>
-          </a:p>
-        </p:txBody>
-      </p:sp>
-    </p:spTree>
-    <p:extLst>
-      <p:ext uri="{BB962C8B-B14F-4D97-AF65-F5344CB8AC3E}">
-        <p14:creationId xmlns:p14="http://schemas.microsoft.com/office/powerpoint/2010/main" val="1124667569"/>
-      </p:ext>
-    </p:extLst>
-  </p:cSld>
-  <p:clrMapOvr>
-    <a:masterClrMapping/>
-  </p:clrMapOvr>
-</p:sld>
-</file>
-
-<file path=ppt/slides/slide9.xml><?xml version="1.0" encoding="utf-8"?>
 <p:sld xmlns:a="http://schemas.openxmlformats.org/drawingml/2006/main" xmlns:r="http://schemas.openxmlformats.org/officeDocument/2006/relationships" xmlns:p="http://schemas.openxmlformats.org/presentationml/2006/main">
   <p:cSld>
     <p:spTree>
@@ -5711,6 +5887,104 @@
     <p:extLst>
       <p:ext uri="{BB962C8B-B14F-4D97-AF65-F5344CB8AC3E}">
         <p14:creationId xmlns:p14="http://schemas.microsoft.com/office/powerpoint/2010/main" val="937953236"/>
+      </p:ext>
+    </p:extLst>
+  </p:cSld>
+  <p:clrMapOvr>
+    <a:masterClrMapping/>
+  </p:clrMapOvr>
+</p:sld>
+</file>
+
+<file path=ppt/slides/slide9.xml><?xml version="1.0" encoding="utf-8"?>
+<p:sld xmlns:a="http://schemas.openxmlformats.org/drawingml/2006/main" xmlns:r="http://schemas.openxmlformats.org/officeDocument/2006/relationships" xmlns:p="http://schemas.openxmlformats.org/presentationml/2006/main">
+  <p:cSld>
+    <p:spTree>
+      <p:nvGrpSpPr>
+        <p:cNvPr id="1" name=""/>
+        <p:cNvGrpSpPr/>
+        <p:nvPr/>
+      </p:nvGrpSpPr>
+      <p:grpSpPr>
+        <a:xfrm>
+          <a:off x="0" y="0"/>
+          <a:ext cx="0" cy="0"/>
+          <a:chOff x="0" y="0"/>
+          <a:chExt cx="0" cy="0"/>
+        </a:xfrm>
+      </p:grpSpPr>
+      <p:sp>
+        <p:nvSpPr>
+          <p:cNvPr id="4" name="Text Placeholder 3"/>
+          <p:cNvSpPr>
+            <a:spLocks noGrp="1"/>
+          </p:cNvSpPr>
+          <p:nvPr>
+            <p:ph type="body" sz="quarter" idx="13"/>
+          </p:nvPr>
+        </p:nvSpPr>
+        <p:spPr/>
+        <p:txBody>
+          <a:bodyPr/>
+          <a:lstStyle/>
+          <a:p>
+            <a:r>
+              <a:rPr lang="en-US" dirty="0" smtClean="0"/>
+              <a:t>Ctrl+. (Dot)  =&gt; R# </a:t>
+            </a:r>
+            <a:r>
+              <a:rPr lang="en-US" dirty="0" err="1" smtClean="0"/>
+              <a:t>Alt+Enter</a:t>
+            </a:r>
+            <a:r>
+              <a:rPr lang="en-US" dirty="0" smtClean="0"/>
+              <a:t> </a:t>
+            </a:r>
+          </a:p>
+          <a:p>
+            <a:r>
+              <a:rPr lang="en-US" dirty="0" smtClean="0"/>
+              <a:t>Ctrl+, (Comma) =&gt; </a:t>
+            </a:r>
+            <a:r>
+              <a:rPr lang="en-US" dirty="0" err="1" smtClean="0"/>
+              <a:t>Goto</a:t>
+            </a:r>
+            <a:r>
+              <a:rPr lang="en-US" dirty="0" smtClean="0"/>
+              <a:t> All</a:t>
+            </a:r>
+            <a:endParaRPr lang="en-US" dirty="0"/>
+          </a:p>
+        </p:txBody>
+      </p:sp>
+      <p:sp>
+        <p:nvSpPr>
+          <p:cNvPr id="3" name="Title 2"/>
+          <p:cNvSpPr>
+            <a:spLocks noGrp="1"/>
+          </p:cNvSpPr>
+          <p:nvPr>
+            <p:ph type="title"/>
+          </p:nvPr>
+        </p:nvSpPr>
+        <p:spPr/>
+        <p:txBody>
+          <a:bodyPr/>
+          <a:lstStyle/>
+          <a:p>
+            <a:r>
+              <a:rPr lang="en-US" dirty="0" smtClean="0"/>
+              <a:t>Important shortcuts</a:t>
+            </a:r>
+            <a:endParaRPr lang="en-US" dirty="0"/>
+          </a:p>
+        </p:txBody>
+      </p:sp>
+    </p:spTree>
+    <p:extLst>
+      <p:ext uri="{BB962C8B-B14F-4D97-AF65-F5344CB8AC3E}">
+        <p14:creationId xmlns:p14="http://schemas.microsoft.com/office/powerpoint/2010/main" val="319059629"/>
       </p:ext>
     </p:extLst>
   </p:cSld>

</xml_diff>